<commit_message>
Added an apostrophe to its -> it's
</commit_message>
<xml_diff>
--- a/s3_reproduceability/lecture/Reproducibility.pptx
+++ b/s3_reproduceability/lecture/Reproducibility.pptx
@@ -5202,7 +5202,7 @@
           <a:p>
             <a:fld id="{D75CAE95-D2DD-4998-876A-092BFD628C65}" type="datetimeFigureOut">
               <a:rPr lang="da-DK" smtClean="0"/>
-              <a:t>21-06-2021</a:t>
+              <a:t>04.01.2022</a:t>
             </a:fld>
             <a:endParaRPr lang="da-DK"/>
           </a:p>
@@ -5280,7 +5280,7 @@
           <a:p>
             <a:fld id="{E4853C36-DB6E-423F-949E-B6BA04403451}" type="slidenum">
               <a:rPr lang="da-DK" smtClean="0"/>
-              <a:t>‹#›</a:t>
+              <a:t>‹nr.›</a:t>
             </a:fld>
             <a:endParaRPr lang="da-DK"/>
           </a:p>
@@ -5380,7 +5380,7 @@
           <a:p>
             <a:fld id="{1DA8E099-58AA-4136-B409-1CAD1943D842}" type="datetimeFigureOut">
               <a:rPr lang="da-DK" smtClean="0"/>
-              <a:t>21-06-2021</a:t>
+              <a:t>04.01.2022</a:t>
             </a:fld>
             <a:endParaRPr lang="da-DK"/>
           </a:p>
@@ -5539,7 +5539,7 @@
           <a:p>
             <a:fld id="{5954DC30-9EA7-4B54-946B-93BCBEFC148F}" type="slidenum">
               <a:rPr lang="da-DK" smtClean="0"/>
-              <a:t>‹#›</a:t>
+              <a:t>‹nr.›</a:t>
             </a:fld>
             <a:endParaRPr lang="da-DK"/>
           </a:p>
@@ -5798,7 +5798,7 @@
           <a:p>
             <a:fld id="{C85334AD-9960-4065-BF34-86ED0345A76D}" type="datetime1">
               <a:rPr lang="en-US" smtClean="0"/>
-              <a:t>6/21/2021</a:t>
+              <a:t>1/4/22</a:t>
             </a:fld>
             <a:endParaRPr lang="da-DK"/>
           </a:p>
@@ -5855,7 +5855,7 @@
           <a:p>
             <a:fld id="{F6FEDE24-D50C-481B-A7B4-8AF13899101A}" type="slidenum">
               <a:rPr lang="da-DK" smtClean="0"/>
-              <a:t>‹#›</a:t>
+              <a:t>‹nr.›</a:t>
             </a:fld>
             <a:endParaRPr lang="da-DK"/>
           </a:p>
@@ -6037,7 +6037,7 @@
           <a:p>
             <a:fld id="{C5669758-3775-48D7-A841-693E908C3BF4}" type="datetime1">
               <a:rPr lang="en-US" smtClean="0"/>
-              <a:t>6/21/2021</a:t>
+              <a:t>1/4/22</a:t>
             </a:fld>
             <a:endParaRPr lang="da-DK"/>
           </a:p>
@@ -6094,7 +6094,7 @@
           <a:p>
             <a:fld id="{F6FEDE24-D50C-481B-A7B4-8AF13899101A}" type="slidenum">
               <a:rPr lang="da-DK" smtClean="0"/>
-              <a:t>‹#›</a:t>
+              <a:t>‹nr.›</a:t>
             </a:fld>
             <a:endParaRPr lang="da-DK"/>
           </a:p>
@@ -6250,7 +6250,7 @@
           <a:p>
             <a:fld id="{1E0C3FF1-EDBD-4F2A-8366-34A4E3728310}" type="datetime1">
               <a:rPr lang="en-US" smtClean="0"/>
-              <a:t>6/21/2021</a:t>
+              <a:t>1/4/22</a:t>
             </a:fld>
             <a:endParaRPr lang="da-DK"/>
           </a:p>
@@ -6307,7 +6307,7 @@
           <a:p>
             <a:fld id="{F6FEDE24-D50C-481B-A7B4-8AF13899101A}" type="slidenum">
               <a:rPr lang="da-DK" smtClean="0"/>
-              <a:t>‹#›</a:t>
+              <a:t>‹nr.›</a:t>
             </a:fld>
             <a:endParaRPr lang="da-DK"/>
           </a:p>
@@ -6471,7 +6471,7 @@
           <a:p>
             <a:fld id="{019E29B9-5584-4737-9C98-1B926378C778}" type="datetime1">
               <a:rPr lang="en-US" smtClean="0"/>
-              <a:t>6/21/2021</a:t>
+              <a:t>1/4/22</a:t>
             </a:fld>
             <a:endParaRPr lang="da-DK"/>
           </a:p>
@@ -6528,7 +6528,7 @@
           <a:p>
             <a:fld id="{F6FEDE24-D50C-481B-A7B4-8AF13899101A}" type="slidenum">
               <a:rPr lang="da-DK" smtClean="0"/>
-              <a:t>‹#›</a:t>
+              <a:t>‹nr.›</a:t>
             </a:fld>
             <a:endParaRPr lang="da-DK"/>
           </a:p>
@@ -6786,7 +6786,7 @@
           <a:p>
             <a:fld id="{FCE38F03-F67D-4508-A858-99FCD085087C}" type="datetime1">
               <a:rPr lang="en-US" smtClean="0"/>
-              <a:t>6/21/2021</a:t>
+              <a:t>1/4/22</a:t>
             </a:fld>
             <a:endParaRPr lang="da-DK"/>
           </a:p>
@@ -6843,7 +6843,7 @@
           <a:p>
             <a:fld id="{F6FEDE24-D50C-481B-A7B4-8AF13899101A}" type="slidenum">
               <a:rPr lang="da-DK" smtClean="0"/>
-              <a:t>‹#›</a:t>
+              <a:t>‹nr.›</a:t>
             </a:fld>
             <a:endParaRPr lang="da-DK"/>
           </a:p>
@@ -7057,7 +7057,7 @@
           <a:p>
             <a:fld id="{B43F2930-3FFD-4F93-A4BD-4F0D1A0B4514}" type="datetime1">
               <a:rPr lang="en-US" smtClean="0"/>
-              <a:t>6/21/2021</a:t>
+              <a:t>1/4/22</a:t>
             </a:fld>
             <a:endParaRPr lang="da-DK"/>
           </a:p>
@@ -7114,7 +7114,7 @@
           <a:p>
             <a:fld id="{F6FEDE24-D50C-481B-A7B4-8AF13899101A}" type="slidenum">
               <a:rPr lang="da-DK" smtClean="0"/>
-              <a:t>‹#›</a:t>
+              <a:t>‹nr.›</a:t>
             </a:fld>
             <a:endParaRPr lang="da-DK"/>
           </a:p>
@@ -7475,7 +7475,7 @@
           <a:p>
             <a:fld id="{8E0F9B9B-30CC-4693-8E0F-1A94A979E2C5}" type="datetime1">
               <a:rPr lang="en-US" smtClean="0"/>
-              <a:t>6/21/2021</a:t>
+              <a:t>1/4/22</a:t>
             </a:fld>
             <a:endParaRPr lang="da-DK"/>
           </a:p>
@@ -7532,7 +7532,7 @@
           <a:p>
             <a:fld id="{F6FEDE24-D50C-481B-A7B4-8AF13899101A}" type="slidenum">
               <a:rPr lang="da-DK" smtClean="0"/>
-              <a:t>‹#›</a:t>
+              <a:t>‹nr.›</a:t>
             </a:fld>
             <a:endParaRPr lang="da-DK"/>
           </a:p>
@@ -7620,7 +7620,7 @@
           <a:p>
             <a:fld id="{6FE1433B-E6A7-44FF-8B55-539471B4D7C5}" type="datetime1">
               <a:rPr lang="en-US" smtClean="0"/>
-              <a:t>6/21/2021</a:t>
+              <a:t>1/4/22</a:t>
             </a:fld>
             <a:endParaRPr lang="da-DK"/>
           </a:p>
@@ -7677,7 +7677,7 @@
           <a:p>
             <a:fld id="{F6FEDE24-D50C-481B-A7B4-8AF13899101A}" type="slidenum">
               <a:rPr lang="da-DK" smtClean="0"/>
-              <a:t>‹#›</a:t>
+              <a:t>‹nr.›</a:t>
             </a:fld>
             <a:endParaRPr lang="da-DK"/>
           </a:p>
@@ -7736,7 +7736,7 @@
           <a:p>
             <a:fld id="{624F4001-6A8C-42DA-824F-B5CC1375B861}" type="datetime1">
               <a:rPr lang="en-US" smtClean="0"/>
-              <a:t>6/21/2021</a:t>
+              <a:t>1/4/22</a:t>
             </a:fld>
             <a:endParaRPr lang="da-DK"/>
           </a:p>
@@ -7793,7 +7793,7 @@
           <a:p>
             <a:fld id="{F6FEDE24-D50C-481B-A7B4-8AF13899101A}" type="slidenum">
               <a:rPr lang="da-DK" smtClean="0"/>
-              <a:t>‹#›</a:t>
+              <a:t>‹nr.›</a:t>
             </a:fld>
             <a:endParaRPr lang="da-DK"/>
           </a:p>
@@ -8052,7 +8052,7 @@
           <a:p>
             <a:fld id="{2D3BE137-2C5E-4078-8BA2-7D42D7E67218}" type="datetime1">
               <a:rPr lang="en-US" smtClean="0"/>
-              <a:t>6/21/2021</a:t>
+              <a:t>1/4/22</a:t>
             </a:fld>
             <a:endParaRPr lang="da-DK"/>
           </a:p>
@@ -8109,7 +8109,7 @@
           <a:p>
             <a:fld id="{F6FEDE24-D50C-481B-A7B4-8AF13899101A}" type="slidenum">
               <a:rPr lang="da-DK" smtClean="0"/>
-              <a:t>‹#›</a:t>
+              <a:t>‹nr.›</a:t>
             </a:fld>
             <a:endParaRPr lang="da-DK"/>
           </a:p>
@@ -8344,7 +8344,7 @@
           <a:p>
             <a:fld id="{0D1436FF-56D3-4E93-92E8-71121EAB120E}" type="datetime1">
               <a:rPr lang="en-US" smtClean="0"/>
-              <a:t>6/21/2021</a:t>
+              <a:t>1/4/22</a:t>
             </a:fld>
             <a:endParaRPr lang="da-DK"/>
           </a:p>
@@ -8401,7 +8401,7 @@
           <a:p>
             <a:fld id="{F6FEDE24-D50C-481B-A7B4-8AF13899101A}" type="slidenum">
               <a:rPr lang="da-DK" smtClean="0"/>
-              <a:t>‹#›</a:t>
+              <a:t>‹nr.›</a:t>
             </a:fld>
             <a:endParaRPr lang="da-DK"/>
           </a:p>
@@ -8590,7 +8590,7 @@
           <a:p>
             <a:fld id="{16601EF2-4BCA-4009-ACCF-B97F259DEF6F}" type="datetime1">
               <a:rPr lang="en-US" smtClean="0"/>
-              <a:t>6/21/2021</a:t>
+              <a:t>1/4/22</a:t>
             </a:fld>
             <a:endParaRPr lang="da-DK"/>
           </a:p>
@@ -8683,7 +8683,7 @@
           <a:p>
             <a:fld id="{F6FEDE24-D50C-481B-A7B4-8AF13899101A}" type="slidenum">
               <a:rPr lang="da-DK" smtClean="0"/>
-              <a:t>‹#›</a:t>
+              <a:t>‹nr.›</a:t>
             </a:fld>
             <a:endParaRPr lang="da-DK"/>
           </a:p>
@@ -9235,7 +9235,7 @@
           <a:p>
             <a:fld id="{019E29B9-5584-4737-9C98-1B926378C778}" type="datetime1">
               <a:rPr lang="en-US" smtClean="0"/>
-              <a:t>6/21/2021</a:t>
+              <a:t>1/4/22</a:t>
             </a:fld>
             <a:endParaRPr lang="da-DK"/>
           </a:p>
@@ -9556,7 +9556,7 @@
           <a:p>
             <a:fld id="{019E29B9-5584-4737-9C98-1B926378C778}" type="datetime1">
               <a:rPr lang="en-US" smtClean="0"/>
-              <a:t>6/21/2021</a:t>
+              <a:t>1/4/22</a:t>
             </a:fld>
             <a:endParaRPr lang="da-DK"/>
           </a:p>
@@ -9734,7 +9734,7 @@
           <a:p>
             <a:fld id="{019E29B9-5584-4737-9C98-1B926378C778}" type="datetime1">
               <a:rPr lang="en-US" smtClean="0"/>
-              <a:t>6/21/2021</a:t>
+              <a:t>1/4/22</a:t>
             </a:fld>
             <a:endParaRPr lang="da-DK"/>
           </a:p>
@@ -9923,7 +9923,7 @@
           <a:p>
             <a:fld id="{019E29B9-5584-4737-9C98-1B926378C778}" type="datetime1">
               <a:rPr lang="en-US" smtClean="0"/>
-              <a:t>6/21/2021</a:t>
+              <a:t>1/4/22</a:t>
             </a:fld>
             <a:endParaRPr lang="da-DK"/>
           </a:p>
@@ -10334,7 +10334,7 @@
           <a:p>
             <a:fld id="{019E29B9-5584-4737-9C98-1B926378C778}" type="datetime1">
               <a:rPr lang="en-US" smtClean="0"/>
-              <a:t>6/21/2021</a:t>
+              <a:t>1/4/22</a:t>
             </a:fld>
             <a:endParaRPr lang="da-DK"/>
           </a:p>
@@ -10562,8 +10562,20 @@
               <a:buNone/>
             </a:pPr>
             <a:r>
+              <a:rPr lang="da-DK" dirty="0" err="1"/>
+              <a:t>Wow</a:t>
+            </a:r>
+            <a:r>
               <a:rPr lang="da-DK" dirty="0"/>
-              <a:t>Wow its bad...</a:t>
+              <a:t> </a:t>
+            </a:r>
+            <a:r>
+              <a:rPr lang="da-DK"/>
+              <a:t>it’s</a:t>
+            </a:r>
+            <a:r>
+              <a:rPr lang="da-DK" dirty="0"/>
+              <a:t> bad...</a:t>
             </a:r>
           </a:p>
           <a:p>
@@ -10657,7 +10669,7 @@
           <a:p>
             <a:fld id="{019E29B9-5584-4737-9C98-1B926378C778}" type="datetime1">
               <a:rPr lang="en-US" smtClean="0"/>
-              <a:t>6/21/2021</a:t>
+              <a:t>1/4/22</a:t>
             </a:fld>
             <a:endParaRPr lang="da-DK"/>
           </a:p>
@@ -10912,7 +10924,7 @@
           <a:p>
             <a:fld id="{019E29B9-5584-4737-9C98-1B926378C778}" type="datetime1">
               <a:rPr lang="en-US" smtClean="0"/>
-              <a:t>6/21/2021</a:t>
+              <a:t>1/4/22</a:t>
             </a:fld>
             <a:endParaRPr lang="da-DK"/>
           </a:p>
@@ -11153,7 +11165,7 @@
           <a:p>
             <a:fld id="{019E29B9-5584-4737-9C98-1B926378C778}" type="datetime1">
               <a:rPr lang="en-US" smtClean="0"/>
-              <a:t>6/21/2021</a:t>
+              <a:t>1/4/22</a:t>
             </a:fld>
             <a:endParaRPr lang="da-DK"/>
           </a:p>
@@ -11389,7 +11401,7 @@
           <a:p>
             <a:fld id="{019E29B9-5584-4737-9C98-1B926378C778}" type="datetime1">
               <a:rPr lang="en-US" smtClean="0"/>
-              <a:t>6/21/2021</a:t>
+              <a:t>1/4/22</a:t>
             </a:fld>
             <a:endParaRPr lang="da-DK"/>
           </a:p>
@@ -11920,7 +11932,7 @@
           <a:p>
             <a:fld id="{019E29B9-5584-4737-9C98-1B926378C778}" type="datetime1">
               <a:rPr lang="en-US" smtClean="0"/>
-              <a:t>6/21/2021</a:t>
+              <a:t>1/4/22</a:t>
             </a:fld>
             <a:endParaRPr lang="da-DK"/>
           </a:p>
@@ -12109,7 +12121,7 @@
             <a:fld id="{019E29B9-5584-4737-9C98-1B926378C778}" type="datetime1">
               <a:rPr lang="en-US" smtClean="0"/>
               <a:pPr/>
-              <a:t>6/21/2021</a:t>
+              <a:t>1/4/22</a:t>
             </a:fld>
             <a:endParaRPr lang="da-DK"/>
           </a:p>
@@ -12964,7 +12976,7 @@
           <a:p>
             <a:fld id="{019E29B9-5584-4737-9C98-1B926378C778}" type="datetime1">
               <a:rPr lang="en-US" smtClean="0"/>
-              <a:t>6/21/2021</a:t>
+              <a:t>1/4/22</a:t>
             </a:fld>
             <a:endParaRPr lang="da-DK"/>
           </a:p>

</xml_diff>